<commit_message>
Pushing new Powerpoint with corrections
</commit_message>
<xml_diff>
--- a/presentation/I Choose YouNoAnimation.pptx
+++ b/presentation/I Choose YouNoAnimation.pptx
@@ -2224,13 +2224,8 @@
           <a:p>
             <a:r>
               <a:rPr lang="en-US" dirty="0" smtClean="0"/>
-              <a:t>Kevin</a:t>
-            </a:r>
-            <a:r>
-              <a:rPr lang="en-US" dirty="0" smtClean="0"/>
-              <a:t>:</a:t>
-            </a:r>
-            <a:endParaRPr lang="en-US" dirty="0" smtClean="0"/>
+              <a:t>Kevin:</a:t>
+            </a:r>
           </a:p>
           <a:p>
             <a:pPr marL="171450" indent="-171450">
@@ -6193,7 +6188,11 @@
           <a:p>
             <a:r>
               <a:rPr lang="en-US" dirty="0" smtClean="0"/>
-              <a:t>An Adventure into the World of Completive Pokémon</a:t>
+              <a:t>An Adventure into the World of </a:t>
+            </a:r>
+            <a:r>
+              <a:rPr lang="en-US" dirty="0" smtClean="0"/>
+              <a:t>Competitive Pokémon</a:t>
             </a:r>
             <a:endParaRPr lang="en-US" dirty="0"/>
           </a:p>
@@ -6809,13 +6808,13 @@
             <a:spLocks noGrp="1"/>
           </p:cNvSpPr>
           <p:nvPr>
-            <p:ph sz="half" idx="2"/>
+            <p:ph sz="half" idx="1"/>
           </p:nvPr>
         </p:nvSpPr>
         <p:spPr>
           <a:xfrm>
-            <a:off x="1562100" y="2193925"/>
-            <a:ext cx="9785350" cy="3978275"/>
+            <a:off x="1569700" y="1825625"/>
+            <a:ext cx="9288800" cy="1260475"/>
           </a:xfrm>
         </p:spPr>
         <p:txBody>
@@ -6824,35 +6823,9 @@
           </a:bodyPr>
           <a:lstStyle/>
           <a:p>
-            <a:r>
-              <a:rPr lang="en-US" sz="3200" dirty="0" smtClean="0">
-                <a:solidFill>
-                  <a:schemeClr val="accent3"/>
-                </a:solidFill>
-              </a:rPr>
-              <a:t>Maps well to our problem</a:t>
-            </a:r>
-          </a:p>
-          <a:p>
-            <a:pPr lvl="1"/>
-            <a:r>
-              <a:rPr lang="en-US" sz="2800" dirty="0" smtClean="0">
-                <a:solidFill>
-                  <a:schemeClr val="accent3"/>
-                </a:solidFill>
-              </a:rPr>
-              <a:t>Clear Winner and Loser classes</a:t>
-            </a:r>
-          </a:p>
-          <a:p>
-            <a:pPr lvl="1"/>
-            <a:endParaRPr lang="en-US" sz="2800" dirty="0">
-              <a:solidFill>
-                <a:schemeClr val="accent3"/>
-              </a:solidFill>
-            </a:endParaRPr>
-          </a:p>
-          <a:p>
+            <a:pPr marL="0" indent="0">
+              <a:buNone/>
+            </a:pPr>
             <a:r>
               <a:rPr lang="en-US" sz="3200" dirty="0" smtClean="0">
                 <a:solidFill>
@@ -6861,65 +6834,215 @@
               </a:rPr>
               <a:t>Supervised</a:t>
             </a:r>
+            <a:endParaRPr lang="en-US" sz="3200" dirty="0">
+              <a:solidFill>
+                <a:schemeClr val="accent3"/>
+              </a:solidFill>
+            </a:endParaRPr>
           </a:p>
           <a:p>
             <a:pPr lvl="1"/>
+            <a:r>
+              <a:rPr lang="en-US" sz="2800" dirty="0">
+                <a:solidFill>
+                  <a:schemeClr val="accent3"/>
+                </a:solidFill>
+              </a:rPr>
+              <a:t>Know the outcomes of the </a:t>
+            </a:r>
             <a:r>
               <a:rPr lang="en-US" sz="2800" dirty="0" smtClean="0">
                 <a:solidFill>
                   <a:schemeClr val="accent3"/>
                 </a:solidFill>
               </a:rPr>
-              <a:t>Know the outcomes of the battles</a:t>
-            </a:r>
-          </a:p>
-        </p:txBody>
-      </p:sp>
-      <p:sp>
-        <p:nvSpPr>
-          <p:cNvPr id="3" name="Text Placeholder 2"/>
-          <p:cNvSpPr>
-            <a:spLocks noGrp="1"/>
-          </p:cNvSpPr>
-          <p:nvPr>
-            <p:ph type="body" idx="1"/>
-          </p:nvPr>
-        </p:nvSpPr>
-        <p:spPr/>
-        <p:txBody>
-          <a:bodyPr>
-            <a:normAutofit/>
+              <a:t>battles</a:t>
+            </a:r>
+            <a:endParaRPr lang="en-US" sz="2800" dirty="0">
+              <a:solidFill>
+                <a:schemeClr val="accent3"/>
+              </a:solidFill>
+            </a:endParaRPr>
+          </a:p>
+        </p:txBody>
+      </p:sp>
+      <p:sp>
+        <p:nvSpPr>
+          <p:cNvPr id="15" name="Title 14"/>
+          <p:cNvSpPr>
+            <a:spLocks noGrp="1"/>
+          </p:cNvSpPr>
+          <p:nvPr>
+            <p:ph type="title"/>
+          </p:nvPr>
+        </p:nvSpPr>
+        <p:spPr>
+          <a:xfrm>
+            <a:off x="2324100" y="293687"/>
+            <a:ext cx="9029700" cy="1325563"/>
+          </a:xfrm>
+        </p:spPr>
+        <p:txBody>
+          <a:bodyPr/>
+          <a:lstStyle/>
+          <a:p>
+            <a:pPr algn="ctr"/>
+            <a:r>
+              <a:rPr lang="en-US" dirty="0" smtClean="0"/>
+              <a:t>How we Did It</a:t>
+            </a:r>
+            <a:endParaRPr lang="en-US" dirty="0"/>
+          </a:p>
+        </p:txBody>
+      </p:sp>
+      <p:sp>
+        <p:nvSpPr>
+          <p:cNvPr id="6" name="TextBox 5"/>
+          <p:cNvSpPr txBox="1"/>
+          <p:nvPr/>
+        </p:nvSpPr>
+        <p:spPr>
+          <a:xfrm flipH="1">
+            <a:off x="1569700" y="3512879"/>
+            <a:ext cx="4588213" cy="1508105"/>
+          </a:xfrm>
+          <a:prstGeom prst="rect">
+            <a:avLst/>
+          </a:prstGeom>
+          <a:noFill/>
+          <a:ln>
+            <a:solidFill>
+              <a:schemeClr val="bg2"/>
+            </a:solidFill>
+          </a:ln>
+        </p:spPr>
+        <p:txBody>
+          <a:bodyPr wrap="square" rtlCol="0" anchor="ctr" anchorCtr="1">
+            <a:spAutoFit/>
           </a:bodyPr>
           <a:lstStyle/>
           <a:p>
             <a:r>
-              <a:rPr lang="en-US" sz="3600" dirty="0" smtClean="0"/>
+              <a:rPr lang="en-US" sz="3200" dirty="0" smtClean="0">
+                <a:solidFill>
+                  <a:schemeClr val="accent3"/>
+                </a:solidFill>
+              </a:rPr>
+              <a:t>Spectral Clustering</a:t>
+            </a:r>
+          </a:p>
+          <a:p>
+            <a:endParaRPr lang="en-US" sz="3200" dirty="0" smtClean="0">
+              <a:solidFill>
+                <a:schemeClr val="accent3"/>
+              </a:solidFill>
+            </a:endParaRPr>
+          </a:p>
+          <a:p>
+            <a:r>
+              <a:rPr lang="en-US" sz="2800" dirty="0" smtClean="0">
+                <a:solidFill>
+                  <a:schemeClr val="accent3"/>
+                </a:solidFill>
+              </a:rPr>
+              <a:t>Not adequate for given data</a:t>
+            </a:r>
+            <a:endParaRPr lang="en-US" sz="2800" dirty="0">
+              <a:solidFill>
+                <a:schemeClr val="accent3"/>
+              </a:solidFill>
+            </a:endParaRPr>
+          </a:p>
+        </p:txBody>
+      </p:sp>
+      <p:sp>
+        <p:nvSpPr>
+          <p:cNvPr id="9" name="TextBox 8"/>
+          <p:cNvSpPr txBox="1"/>
+          <p:nvPr/>
+        </p:nvSpPr>
+        <p:spPr>
+          <a:xfrm flipH="1">
+            <a:off x="6296024" y="3512879"/>
+            <a:ext cx="5210175" cy="2154436"/>
+          </a:xfrm>
+          <a:prstGeom prst="rect">
+            <a:avLst/>
+          </a:prstGeom>
+          <a:noFill/>
+          <a:ln>
+            <a:solidFill>
+              <a:schemeClr val="bg2"/>
+            </a:solidFill>
+          </a:ln>
+        </p:spPr>
+        <p:txBody>
+          <a:bodyPr wrap="square" rtlCol="0" anchor="ctr" anchorCtr="1">
+            <a:spAutoFit/>
+          </a:bodyPr>
+          <a:lstStyle/>
+          <a:p>
+            <a:r>
+              <a:rPr lang="en-US" sz="3200" dirty="0">
+                <a:solidFill>
+                  <a:schemeClr val="accent3"/>
+                </a:solidFill>
+              </a:rPr>
               <a:t>Naïve Bayes</a:t>
             </a:r>
-            <a:endParaRPr lang="en-US" sz="3600" dirty="0"/>
-          </a:p>
-        </p:txBody>
-      </p:sp>
-      <p:sp>
-        <p:nvSpPr>
-          <p:cNvPr id="15" name="Title 14"/>
-          <p:cNvSpPr>
-            <a:spLocks noGrp="1"/>
-          </p:cNvSpPr>
-          <p:nvPr>
-            <p:ph type="title"/>
-          </p:nvPr>
-        </p:nvSpPr>
-        <p:spPr/>
-        <p:txBody>
-          <a:bodyPr/>
-          <a:lstStyle/>
-          <a:p>
-            <a:pPr algn="ctr"/>
-            <a:r>
-              <a:rPr lang="en-US" dirty="0" smtClean="0"/>
-              <a:t>How we Did It</a:t>
-            </a:r>
+          </a:p>
+          <a:p>
+            <a:endParaRPr lang="en-US" sz="2800" dirty="0" smtClean="0">
+              <a:solidFill>
+                <a:schemeClr val="accent3"/>
+              </a:solidFill>
+            </a:endParaRPr>
+          </a:p>
+          <a:p>
+            <a:r>
+              <a:rPr lang="en-US" sz="2800" dirty="0" smtClean="0">
+                <a:solidFill>
+                  <a:schemeClr val="accent3"/>
+                </a:solidFill>
+              </a:rPr>
+              <a:t>Maps </a:t>
+            </a:r>
+            <a:r>
+              <a:rPr lang="en-US" sz="2800" dirty="0">
+                <a:solidFill>
+                  <a:schemeClr val="accent3"/>
+                </a:solidFill>
+              </a:rPr>
+              <a:t>well to our </a:t>
+            </a:r>
+            <a:r>
+              <a:rPr lang="en-US" sz="2800" dirty="0" smtClean="0">
+                <a:solidFill>
+                  <a:schemeClr val="accent3"/>
+                </a:solidFill>
+              </a:rPr>
+              <a:t>problem</a:t>
+            </a:r>
+          </a:p>
+          <a:p>
+            <a:r>
+              <a:rPr lang="en-US" sz="2800" dirty="0" smtClean="0">
+                <a:solidFill>
+                  <a:schemeClr val="accent3"/>
+                </a:solidFill>
+              </a:rPr>
+              <a:t>Clear </a:t>
+            </a:r>
+            <a:r>
+              <a:rPr lang="en-US" sz="2800" dirty="0">
+                <a:solidFill>
+                  <a:schemeClr val="accent3"/>
+                </a:solidFill>
+              </a:rPr>
+              <a:t>Winner and Loser classes</a:t>
+            </a:r>
+          </a:p>
+          <a:p>
             <a:endParaRPr lang="en-US" dirty="0"/>
           </a:p>
         </p:txBody>
@@ -7454,19 +7577,21 @@
                   <a:schemeClr val="accent3"/>
                 </a:solidFill>
               </a:rPr>
-              <a:t>Too many sparse features</a:t>
-            </a:r>
-          </a:p>
-          <a:p>
-            <a:pPr lvl="2"/>
-            <a:r>
-              <a:rPr lang="en-US" sz="2600" dirty="0" smtClean="0">
+              <a:t>Too many sparse </a:t>
+            </a:r>
+            <a:r>
+              <a:rPr lang="en-US" sz="2800" dirty="0" smtClean="0">
                 <a:solidFill>
                   <a:schemeClr val="accent3"/>
                 </a:solidFill>
               </a:rPr>
-              <a:t>Over fitting</a:t>
-            </a:r>
+              <a:t>features</a:t>
+            </a:r>
+            <a:endParaRPr lang="en-US" sz="2600" dirty="0" smtClean="0">
+              <a:solidFill>
+                <a:schemeClr val="accent3"/>
+              </a:solidFill>
+            </a:endParaRPr>
           </a:p>
           <a:p>
             <a:pPr marL="0" indent="0">

</xml_diff>